<commit_message>
update WorldCup dataset reference.
</commit_message>
<xml_diff>
--- a/BDAPRO Midterm Presentation - Wavelet Histogram.pptx
+++ b/BDAPRO Midterm Presentation - Wavelet Histogram.pptx
@@ -298,7 +298,7 @@
               <a:pPr>
                 <a:defRPr/>
               </a:pPr>
-              <a:t>17.01.2018</a:t>
+              <a:t>18.01.2018</a:t>
             </a:fld>
             <a:endParaRPr lang="de-DE"/>
           </a:p>
@@ -530,7 +530,7 @@
               <a:pPr>
                 <a:defRPr/>
               </a:pPr>
-              <a:t>17.01.2018</a:t>
+              <a:t>18.01.2018</a:t>
             </a:fld>
             <a:endParaRPr lang="de-DE"/>
           </a:p>
@@ -4399,7 +4399,7 @@
             <a:fld id="{B1D7DE6A-53E9-48DF-ADFA-79B543AC8321}" type="datetime1">
               <a:rPr lang="de-DE" altLang="en-US" sz="1200"/>
               <a:pPr algn="ctr"/>
-              <a:t>17.01.2018</a:t>
+              <a:t>18.01.2018</a:t>
             </a:fld>
             <a:endParaRPr lang="de-DE" altLang="en-US" sz="1200"/>
           </a:p>
@@ -7479,29 +7479,22 @@
             </a:pPr>
             <a:r>
               <a:rPr lang="en-US" sz="2200" dirty="0"/>
-              <a:t>[3] M. </a:t>
-            </a:r>
-            <a:r>
-              <a:rPr lang="en-US" sz="2200" dirty="0" err="1"/>
-              <a:t>Arlitt</a:t>
-            </a:r>
-            <a:r>
-              <a:rPr lang="en-US" sz="2200" dirty="0"/>
-              <a:t> and T. </a:t>
-            </a:r>
-            <a:r>
-              <a:rPr lang="en-US" sz="2200" dirty="0" err="1"/>
-              <a:t>Jin</a:t>
-            </a:r>
-            <a:r>
-              <a:rPr lang="en-US" sz="2200" dirty="0"/>
-              <a:t>. Workload characterization of the 1998 world cup web site. Technical report, IEEE Network, 1999.</a:t>
-            </a:r>
-          </a:p>
-          <a:p>
-            <a:pPr marL="0" indent="0">
-              <a:buNone/>
-            </a:pPr>
+              <a:t>[3] </a:t>
+            </a:r>
+            <a:r>
+              <a:rPr lang="en-US" u="sng" dirty="0">
+                <a:hlinkClick r:id="rId3"/>
+              </a:rPr>
+              <a:t>http://ita.ee.lbl.gov/html/contrib/WorldCup.html</a:t>
+            </a:r>
+            <a:r>
+              <a:rPr lang="en-US" dirty="0"/>
+              <a:t> </a:t>
+            </a:r>
+            <a:r>
+              <a:rPr lang="en-US"/>
+              <a:t>(Accessed 18 January 2018)</a:t>
+            </a:r>
             <a:endParaRPr lang="en-US" sz="2200" dirty="0"/>
           </a:p>
         </p:txBody>

</xml_diff>